<commit_message>
Added viirs chlorophyll-a and burned areas
</commit_message>
<xml_diff>
--- a/FloodMappingWorkshop-3.pptx
+++ b/FloodMappingWorkshop-3.pptx
@@ -5,10 +5,10 @@
     <p:sldMasterId id="2147483648" r:id="rId1"/>
   </p:sldMasterIdLst>
   <p:notesMasterIdLst>
-    <p:notesMasterId r:id="rId17"/>
+    <p:notesMasterId r:id="rId18"/>
   </p:notesMasterIdLst>
   <p:handoutMasterIdLst>
-    <p:handoutMasterId r:id="rId18"/>
+    <p:handoutMasterId r:id="rId19"/>
   </p:handoutMasterIdLst>
   <p:sldIdLst>
     <p:sldId id="257" r:id="rId2"/>
@@ -26,6 +26,7 @@
     <p:sldId id="267" r:id="rId14"/>
     <p:sldId id="268" r:id="rId15"/>
     <p:sldId id="269" r:id="rId16"/>
+    <p:sldId id="271" r:id="rId17"/>
   </p:sldIdLst>
   <p:sldSz cx="9144000" cy="6858000" type="screen4x3"/>
   <p:notesSz cx="6858000" cy="9144000"/>
@@ -209,7 +210,7 @@
           <a:p>
             <a:fld id="{5A3D6B7C-33BC-1D4F-9B5A-2B6E9DBAAD0B}" type="datetimeFigureOut">
               <a:rPr lang="en-US" smtClean="0"/>
-              <a:t>4/13/15</a:t>
+              <a:t>4/14/15</a:t>
             </a:fld>
             <a:endParaRPr lang="en-US"/>
           </a:p>
@@ -375,7 +376,7 @@
           <a:p>
             <a:fld id="{767F0BB6-A602-7245-903A-3CA99AD4D6C6}" type="datetimeFigureOut">
               <a:rPr lang="en-US" smtClean="0"/>
-              <a:t>4/13/15</a:t>
+              <a:t>4/14/15</a:t>
             </a:fld>
             <a:endParaRPr lang="en-US"/>
           </a:p>
@@ -825,7 +826,7 @@
           <a:p>
             <a:fld id="{CD0FB62E-A468-CC40-9538-6696EE76F2F6}" type="datetime1">
               <a:rPr lang="en-US" smtClean="0"/>
-              <a:t>4/13/15</a:t>
+              <a:t>4/14/15</a:t>
             </a:fld>
             <a:endParaRPr lang="en-US"/>
           </a:p>
@@ -995,7 +996,7 @@
           <a:p>
             <a:fld id="{915AF9FC-6D54-AC4C-A505-45B177B5B32C}" type="datetime1">
               <a:rPr lang="en-US" smtClean="0"/>
-              <a:t>4/13/15</a:t>
+              <a:t>4/14/15</a:t>
             </a:fld>
             <a:endParaRPr lang="en-US"/>
           </a:p>
@@ -1175,7 +1176,7 @@
           <a:p>
             <a:fld id="{28F86427-2078-334A-B729-39E79A151C52}" type="datetime1">
               <a:rPr lang="en-US" smtClean="0"/>
-              <a:t>4/13/15</a:t>
+              <a:t>4/14/15</a:t>
             </a:fld>
             <a:endParaRPr lang="en-US"/>
           </a:p>
@@ -1345,7 +1346,7 @@
           <a:p>
             <a:fld id="{62B62E2B-6FF5-4642-A40D-54D1954F67DB}" type="datetime1">
               <a:rPr lang="en-US" smtClean="0"/>
-              <a:t>4/13/15</a:t>
+              <a:t>4/14/15</a:t>
             </a:fld>
             <a:endParaRPr lang="en-US"/>
           </a:p>
@@ -1591,7 +1592,7 @@
           <a:p>
             <a:fld id="{19CF2F0C-0E0C-A54E-9E9D-3C7B31F9C029}" type="datetime1">
               <a:rPr lang="en-US" smtClean="0"/>
-              <a:t>4/13/15</a:t>
+              <a:t>4/14/15</a:t>
             </a:fld>
             <a:endParaRPr lang="en-US"/>
           </a:p>
@@ -1879,7 +1880,7 @@
           <a:p>
             <a:fld id="{5A5C3A8E-43C2-D041-8C6D-E1FBEE8FF96A}" type="datetime1">
               <a:rPr lang="en-US" smtClean="0"/>
-              <a:t>4/13/15</a:t>
+              <a:t>4/14/15</a:t>
             </a:fld>
             <a:endParaRPr lang="en-US"/>
           </a:p>
@@ -2301,7 +2302,7 @@
           <a:p>
             <a:fld id="{F9D61CBC-DE32-6A43-A20E-8EF43D6F087B}" type="datetime1">
               <a:rPr lang="en-US" smtClean="0"/>
-              <a:t>4/13/15</a:t>
+              <a:t>4/14/15</a:t>
             </a:fld>
             <a:endParaRPr lang="en-US"/>
           </a:p>
@@ -2419,7 +2420,7 @@
           <a:p>
             <a:fld id="{3C6CACC1-61E3-8C46-B848-A365CA6C3DA7}" type="datetime1">
               <a:rPr lang="en-US" smtClean="0"/>
-              <a:t>4/13/15</a:t>
+              <a:t>4/14/15</a:t>
             </a:fld>
             <a:endParaRPr lang="en-US"/>
           </a:p>
@@ -2514,7 +2515,7 @@
           <a:p>
             <a:fld id="{7DD862B6-A61F-824A-A4CB-48C60223B901}" type="datetime1">
               <a:rPr lang="en-US" smtClean="0"/>
-              <a:t>4/13/15</a:t>
+              <a:t>4/14/15</a:t>
             </a:fld>
             <a:endParaRPr lang="en-US"/>
           </a:p>
@@ -2791,7 +2792,7 @@
           <a:p>
             <a:fld id="{94DE169F-90C9-E94A-9FC0-21364461BE1F}" type="datetime1">
               <a:rPr lang="en-US" smtClean="0"/>
-              <a:t>4/13/15</a:t>
+              <a:t>4/14/15</a:t>
             </a:fld>
             <a:endParaRPr lang="en-US"/>
           </a:p>
@@ -3044,7 +3045,7 @@
           <a:p>
             <a:fld id="{FE9D00C9-C0B6-2A49-80AB-71992F20AE33}" type="datetime1">
               <a:rPr lang="en-US" smtClean="0"/>
-              <a:t>4/13/15</a:t>
+              <a:t>4/14/15</a:t>
             </a:fld>
             <a:endParaRPr lang="en-US"/>
           </a:p>
@@ -3257,7 +3258,7 @@
           <a:p>
             <a:fld id="{3458D404-A167-6540-9E22-5F0614CCD0F1}" type="datetime1">
               <a:rPr lang="en-US" smtClean="0"/>
-              <a:t>4/13/15</a:t>
+              <a:t>4/14/15</a:t>
             </a:fld>
             <a:endParaRPr lang="en-US"/>
           </a:p>
@@ -3666,20 +3667,12 @@
               <a:rPr lang="en-US" dirty="0" smtClean="0"/>
               <a:t>Huntsville, AL</a:t>
             </a:r>
-            <a:r>
-              <a:rPr lang="en-US" dirty="0" smtClean="0"/>
-              <a:t/>
-            </a:r>
             <a:br>
               <a:rPr lang="en-US" dirty="0" smtClean="0"/>
             </a:br>
             <a:r>
               <a:rPr lang="en-US" sz="2000" dirty="0" smtClean="0"/>
-              <a:t>Apr 14-16th</a:t>
-            </a:r>
-            <a:r>
-              <a:rPr lang="en-US" sz="2000" dirty="0" smtClean="0"/>
-              <a:t>, 2015</a:t>
+              <a:t>Apr 14-16th, 2015</a:t>
             </a:r>
             <a:endParaRPr lang="en-US" sz="2000" dirty="0"/>
           </a:p>
@@ -4029,7 +4022,6 @@
               <a:rPr lang="en-US" dirty="0" smtClean="0"/>
               <a:t>Data</a:t>
             </a:r>
-            <a:endParaRPr lang="en-US" dirty="0" smtClean="0"/>
           </a:p>
           <a:p>
             <a:endParaRPr lang="en-US" dirty="0">
@@ -4069,11 +4061,7 @@
             </a:r>
             <a:r>
               <a:rPr lang="en-US" dirty="0" smtClean="0"/>
-              <a:t>: Laptop, </a:t>
-            </a:r>
-            <a:r>
-              <a:rPr lang="en-US" dirty="0" smtClean="0"/>
-              <a:t>Storage (S3) and Relational Database Service (RDS)</a:t>
+              <a:t>: Laptop, Storage (S3) and Relational Database Service (RDS)</a:t>
             </a:r>
             <a:endParaRPr lang="en-US" dirty="0"/>
           </a:p>
@@ -4084,11 +4072,7 @@
             </a:r>
             <a:r>
               <a:rPr lang="en-US" dirty="0" smtClean="0"/>
-              <a:t>: Python </a:t>
-            </a:r>
-            <a:r>
-              <a:rPr lang="en-US" dirty="0" smtClean="0"/>
-              <a:t>Algorithms, Put product in S3</a:t>
+              <a:t>: Python Algorithms, Put product in S3</a:t>
             </a:r>
             <a:endParaRPr lang="en-US" dirty="0"/>
           </a:p>
@@ -5647,6 +5631,237 @@
 </p:sld>
 </file>
 
+<file path=ppt/slides/slide16.xml><?xml version="1.0" encoding="utf-8"?>
+<p:sld xmlns:a="http://schemas.openxmlformats.org/drawingml/2006/main" xmlns:r="http://schemas.openxmlformats.org/officeDocument/2006/relationships" xmlns:p="http://schemas.openxmlformats.org/presentationml/2006/main">
+  <p:cSld>
+    <p:spTree>
+      <p:nvGrpSpPr>
+        <p:cNvPr id="1" name=""/>
+        <p:cNvGrpSpPr/>
+        <p:nvPr/>
+      </p:nvGrpSpPr>
+      <p:grpSpPr>
+        <a:xfrm>
+          <a:off x="0" y="0"/>
+          <a:ext cx="0" cy="0"/>
+          <a:chOff x="0" y="0"/>
+          <a:chExt cx="0" cy="0"/>
+        </a:xfrm>
+      </p:grpSpPr>
+      <p:sp>
+        <p:nvSpPr>
+          <p:cNvPr id="2" name="Title 1"/>
+          <p:cNvSpPr>
+            <a:spLocks noGrp="1"/>
+          </p:cNvSpPr>
+          <p:nvPr>
+            <p:ph type="title"/>
+          </p:nvPr>
+        </p:nvSpPr>
+        <p:spPr>
+          <a:xfrm>
+            <a:off x="457200" y="32066"/>
+            <a:ext cx="8229600" cy="766994"/>
+          </a:xfrm>
+        </p:spPr>
+        <p:txBody>
+          <a:bodyPr/>
+          <a:lstStyle/>
+          <a:p>
+            <a:r>
+              <a:rPr lang="en-US" dirty="0" smtClean="0"/>
+              <a:t>Accomplishment</a:t>
+            </a:r>
+            <a:endParaRPr lang="en-US" dirty="0"/>
+          </a:p>
+        </p:txBody>
+      </p:sp>
+      <p:sp>
+        <p:nvSpPr>
+          <p:cNvPr id="3" name="Content Placeholder 2"/>
+          <p:cNvSpPr>
+            <a:spLocks noGrp="1"/>
+          </p:cNvSpPr>
+          <p:nvPr>
+            <p:ph idx="1"/>
+          </p:nvPr>
+        </p:nvSpPr>
+        <p:spPr>
+          <a:xfrm>
+            <a:off x="457200" y="1129169"/>
+            <a:ext cx="8229600" cy="5257800"/>
+          </a:xfrm>
+        </p:spPr>
+        <p:txBody>
+          <a:bodyPr>
+            <a:normAutofit fontScale="77500" lnSpcReduction="20000"/>
+          </a:bodyPr>
+          <a:lstStyle/>
+          <a:p>
+            <a:r>
+              <a:rPr lang="en-US" dirty="0" smtClean="0"/>
+              <a:t>How to Develop Locally and Publish to Amazon S3</a:t>
+            </a:r>
+          </a:p>
+          <a:p>
+            <a:pPr lvl="1"/>
+            <a:r>
+              <a:rPr lang="en-US" dirty="0" smtClean="0"/>
+              <a:t>Mac / Windows VM</a:t>
+            </a:r>
+          </a:p>
+          <a:p>
+            <a:r>
+              <a:rPr lang="en-US" dirty="0" smtClean="0"/>
+              <a:t>New Products Generation (Python)</a:t>
+            </a:r>
+          </a:p>
+          <a:p>
+            <a:pPr lvl="1"/>
+            <a:r>
+              <a:rPr lang="en-US" dirty="0" smtClean="0"/>
+              <a:t>MODIS Active Fires (</a:t>
+            </a:r>
+            <a:r>
+              <a:rPr lang="en-US" dirty="0" err="1" smtClean="0"/>
+              <a:t>GeoJSON</a:t>
+            </a:r>
+            <a:r>
+              <a:rPr lang="en-US" dirty="0"/>
+              <a:t>)</a:t>
+            </a:r>
+            <a:endParaRPr lang="en-US" dirty="0" smtClean="0"/>
+          </a:p>
+          <a:p>
+            <a:pPr lvl="1"/>
+            <a:r>
+              <a:rPr lang="en-US" dirty="0" smtClean="0"/>
+              <a:t>MODIS Burned Areas (</a:t>
+            </a:r>
+            <a:r>
+              <a:rPr lang="en-US" dirty="0" err="1" smtClean="0"/>
+              <a:t>toposjon</a:t>
+            </a:r>
+            <a:r>
+              <a:rPr lang="en-US" dirty="0" smtClean="0"/>
+              <a:t>)</a:t>
+            </a:r>
+          </a:p>
+          <a:p>
+            <a:pPr lvl="1"/>
+            <a:r>
+              <a:rPr lang="en-US" dirty="0" smtClean="0"/>
+              <a:t>VIIRS Chlorophyll-A (</a:t>
+            </a:r>
+            <a:r>
+              <a:rPr lang="en-US" dirty="0" err="1" smtClean="0"/>
+              <a:t>netCDF</a:t>
+            </a:r>
+            <a:r>
+              <a:rPr lang="en-US" dirty="0" smtClean="0"/>
+              <a:t>)</a:t>
+            </a:r>
+          </a:p>
+          <a:p>
+            <a:pPr lvl="1"/>
+            <a:r>
+              <a:rPr lang="en-US" dirty="0" smtClean="0"/>
+              <a:t>USGS Quakes</a:t>
+            </a:r>
+          </a:p>
+          <a:p>
+            <a:pPr lvl="1"/>
+            <a:r>
+              <a:rPr lang="en-US" dirty="0" smtClean="0"/>
+              <a:t>NOAA Vegetation Health Index</a:t>
+            </a:r>
+          </a:p>
+          <a:p>
+            <a:pPr lvl="1"/>
+            <a:r>
+              <a:rPr lang="en-US" dirty="0" smtClean="0"/>
+              <a:t>TRMM/GPM 24hr</a:t>
+            </a:r>
+          </a:p>
+          <a:p>
+            <a:pPr lvl="1"/>
+            <a:r>
+              <a:rPr lang="en-US" dirty="0" smtClean="0"/>
+              <a:t>EF5: Inundation Maps, Soil Moisture, SWE, </a:t>
+            </a:r>
+            <a:r>
+              <a:rPr lang="en-US" dirty="0" err="1" smtClean="0"/>
+              <a:t>StreamFlow</a:t>
+            </a:r>
+            <a:endParaRPr lang="en-US" dirty="0" smtClean="0"/>
+          </a:p>
+          <a:p>
+            <a:r>
+              <a:rPr lang="en-US" dirty="0" smtClean="0"/>
+              <a:t>Modify Publisher </a:t>
+            </a:r>
+          </a:p>
+          <a:p>
+            <a:r>
+              <a:rPr lang="en-US" dirty="0" smtClean="0"/>
+              <a:t>Modify Routes (RCMRD/ICIMOD)</a:t>
+            </a:r>
+          </a:p>
+          <a:p>
+            <a:r>
+              <a:rPr lang="en-US" dirty="0" smtClean="0"/>
+              <a:t>Publish To Facebook/Twitter</a:t>
+            </a:r>
+          </a:p>
+          <a:p>
+            <a:r>
+              <a:rPr lang="en-US" dirty="0" smtClean="0"/>
+              <a:t>Translation </a:t>
+            </a:r>
+            <a:r>
+              <a:rPr lang="en-US" smtClean="0"/>
+              <a:t>(Spanish)</a:t>
+            </a:r>
+            <a:endParaRPr lang="en-US" dirty="0"/>
+          </a:p>
+        </p:txBody>
+      </p:sp>
+      <p:sp>
+        <p:nvSpPr>
+          <p:cNvPr id="4" name="Slide Number Placeholder 3"/>
+          <p:cNvSpPr>
+            <a:spLocks noGrp="1"/>
+          </p:cNvSpPr>
+          <p:nvPr>
+            <p:ph type="sldNum" sz="quarter" idx="12"/>
+          </p:nvPr>
+        </p:nvSpPr>
+        <p:spPr/>
+        <p:txBody>
+          <a:bodyPr/>
+          <a:lstStyle/>
+          <a:p>
+            <a:fld id="{8AC0A081-32B5-ED47-8A67-1E98BEE32DA1}" type="slidenum">
+              <a:rPr lang="en-US" smtClean="0"/>
+              <a:t>16</a:t>
+            </a:fld>
+            <a:endParaRPr lang="en-US"/>
+          </a:p>
+        </p:txBody>
+      </p:sp>
+    </p:spTree>
+    <p:extLst>
+      <p:ext uri="{BB962C8B-B14F-4D97-AF65-F5344CB8AC3E}">
+        <p14:creationId xmlns:p14="http://schemas.microsoft.com/office/powerpoint/2010/main" val="3733287582"/>
+      </p:ext>
+    </p:extLst>
+  </p:cSld>
+  <p:clrMapOvr>
+    <a:masterClrMapping/>
+  </p:clrMapOvr>
+</p:sld>
+</file>
+
 <file path=ppt/slides/slide2.xml><?xml version="1.0" encoding="utf-8"?>
 <p:sld xmlns:a="http://schemas.openxmlformats.org/drawingml/2006/main" xmlns:r="http://schemas.openxmlformats.org/officeDocument/2006/relationships" xmlns:p="http://schemas.openxmlformats.org/presentationml/2006/main">
   <p:cSld>
@@ -5876,13 +6091,7 @@
               <a:rPr lang="en-US" sz="1600" dirty="0" smtClean="0">
                 <a:hlinkClick r:id="rId7"/>
               </a:rPr>
-              <a:t>/</a:t>
-            </a:r>
-            <a:r>
-              <a:rPr lang="en-US" sz="1600" dirty="0" smtClean="0">
-                <a:hlinkClick r:id="rId7"/>
-              </a:rPr>
-              <a:t>FloodMapsWorkshop.git</a:t>
+              <a:t>/FloodMapsWorkshop.git</a:t>
             </a:r>
             <a:endParaRPr lang="en-US" sz="1600" dirty="0" smtClean="0"/>
           </a:p>
@@ -5900,7 +6109,6 @@
               <a:rPr lang="en-US" sz="1600" dirty="0" smtClean="0"/>
               <a:t> pull to get latest update</a:t>
             </a:r>
-            <a:endParaRPr lang="en-US" sz="1600" dirty="0" smtClean="0"/>
           </a:p>
           <a:p>
             <a:r>
@@ -5915,7 +6123,6 @@
               <a:rPr lang="en-US" sz="1600" dirty="0" smtClean="0"/>
               <a:t>AWS – Need AWS Instance, RDS and S3</a:t>
             </a:r>
-            <a:endParaRPr lang="en-US" sz="1600" dirty="0" smtClean="0"/>
           </a:p>
           <a:p>
             <a:pPr lvl="1"/>
@@ -6151,14 +6358,14 @@
           <p:nvPr>
             <p:extLst>
               <p:ext uri="{D42A27DB-BD31-4B8C-83A1-F6EECF244321}">
-                <p14:modId xmlns:p14="http://schemas.microsoft.com/office/powerpoint/2010/main" val="3808168542"/>
+                <p14:modId xmlns:p14="http://schemas.microsoft.com/office/powerpoint/2010/main" val="2349201892"/>
               </p:ext>
             </p:extLst>
           </p:nvPr>
         </p:nvGraphicFramePr>
         <p:xfrm>
           <a:off x="363104" y="1176580"/>
-          <a:ext cx="8573454" cy="3207516"/>
+          <a:ext cx="8573454" cy="3365757"/>
         </p:xfrm>
         <a:graphic>
           <a:graphicData uri="http://schemas.openxmlformats.org/drawingml/2006/table">
@@ -6383,7 +6590,7 @@
                           <a:ea typeface="+mn-ea"/>
                           <a:cs typeface="+mn-cs"/>
                         </a:rPr>
-                        <a:t>Chris</a:t>
+                        <a:t>Chris Stanton</a:t>
                       </a:r>
                       <a:endParaRPr lang="en-US" dirty="0"/>
                     </a:p>
@@ -6553,6 +6760,17 @@
                         </a:rPr>
                         <a:t> </a:t>
                       </a:r>
+                      <a:r>
+                        <a:rPr lang="en-US" sz="1800" kern="1200" dirty="0" smtClean="0">
+                          <a:solidFill>
+                            <a:schemeClr val="dk1"/>
+                          </a:solidFill>
+                          <a:latin typeface="+mn-lt"/>
+                          <a:ea typeface="+mn-ea"/>
+                          <a:cs typeface="+mn-cs"/>
+                        </a:rPr>
+                        <a:t>Lance Gilliland</a:t>
+                      </a:r>
                       <a:endParaRPr lang="en-US" dirty="0"/>
                     </a:p>
                   </a:txBody>
@@ -6563,10 +6781,41 @@
                     <a:bodyPr/>
                     <a:lstStyle/>
                     <a:p>
+                      <a:pPr marL="0" marR="0" indent="0" algn="l" defTabSz="457200" rtl="0" eaLnBrk="1" fontAlgn="auto" latinLnBrk="0" hangingPunct="1">
+                        <a:lnSpc>
+                          <a:spcPct val="100000"/>
+                        </a:lnSpc>
+                        <a:spcBef>
+                          <a:spcPts val="0"/>
+                        </a:spcBef>
+                        <a:spcAft>
+                          <a:spcPts val="0"/>
+                        </a:spcAft>
+                        <a:buClrTx/>
+                        <a:buSzTx/>
+                        <a:buFontTx/>
+                        <a:buNone/>
+                        <a:tabLst/>
+                        <a:defRPr/>
+                      </a:pPr>
                       <a:r>
                         <a:rPr lang="en-US" dirty="0" smtClean="0"/>
                         <a:t> </a:t>
                       </a:r>
+                      <a:r>
+                        <a:rPr lang="en-US" sz="1800" kern="1200" dirty="0" smtClean="0">
+                          <a:solidFill>
+                            <a:schemeClr val="dk1"/>
+                          </a:solidFill>
+                          <a:latin typeface="+mn-lt"/>
+                          <a:ea typeface="+mn-ea"/>
+                          <a:cs typeface="+mn-cs"/>
+                        </a:rPr>
+                        <a:t>NASA/MSFC/USRA</a:t>
+                      </a:r>
+                      <a:endParaRPr lang="en-US" dirty="0" smtClean="0"/>
+                    </a:p>
+                    <a:p>
                       <a:endParaRPr lang="en-US" dirty="0"/>
                     </a:p>
                   </a:txBody>
@@ -6695,14 +6944,12 @@
               <a:rPr lang="en-US" dirty="0" smtClean="0"/>
               <a:t>Spanish Language Accessible</a:t>
             </a:r>
-            <a:endParaRPr lang="en-US" dirty="0" smtClean="0"/>
           </a:p>
           <a:p>
             <a:r>
               <a:rPr lang="en-US" dirty="0" smtClean="0"/>
               <a:t>Disseminate Via Facebook/Twitter</a:t>
             </a:r>
-            <a:endParaRPr lang="en-US" dirty="0" smtClean="0"/>
           </a:p>
           <a:p>
             <a:endParaRPr lang="en-US" dirty="0" smtClean="0"/>
@@ -7929,13 +8176,7 @@
               <a:rPr lang="en-US" sz="1200" dirty="0" smtClean="0">
                 <a:latin typeface="Helvetica Neue"/>
               </a:rPr>
-              <a:t> </a:t>
-            </a:r>
-            <a:r>
-              <a:rPr lang="en-US" sz="1200" dirty="0" smtClean="0">
-                <a:latin typeface="Helvetica Neue"/>
-              </a:rPr>
-              <a:t>NDVI</a:t>
+              <a:t> NDVI</a:t>
             </a:r>
           </a:p>
           <a:p>
@@ -7989,9 +8230,6 @@
               </a:rPr>
               <a:t>Temperature?</a:t>
             </a:r>
-            <a:endParaRPr lang="en-US" sz="1200" b="1" dirty="0" smtClean="0">
-              <a:latin typeface="Helvetica Neue"/>
-            </a:endParaRPr>
           </a:p>
           <a:p>
             <a:r>
@@ -10655,15 +10893,7 @@
           <a:p>
             <a:r>
               <a:rPr lang="en-US" sz="3200" dirty="0" smtClean="0"/>
-              <a:t>What We </a:t>
-            </a:r>
-            <a:r>
-              <a:rPr lang="en-US" sz="3200" dirty="0" smtClean="0"/>
-              <a:t>Will Accomplish </a:t>
-            </a:r>
-            <a:r>
-              <a:rPr lang="en-US" sz="3200" dirty="0" smtClean="0"/>
-              <a:t>Today</a:t>
+              <a:t>What We Will Accomplish Today</a:t>
             </a:r>
             <a:endParaRPr lang="en-US" sz="3200" dirty="0"/>
           </a:p>
@@ -10766,7 +10996,6 @@
               <a:rPr lang="en-US" dirty="0" smtClean="0"/>
               <a:t>Data</a:t>
             </a:r>
-            <a:endParaRPr lang="en-US" dirty="0" smtClean="0"/>
           </a:p>
           <a:p>
             <a:endParaRPr lang="en-US" dirty="0">
@@ -10817,11 +11046,7 @@
             </a:r>
             <a:r>
               <a:rPr lang="en-US" dirty="0" smtClean="0"/>
-              <a:t>: Python </a:t>
-            </a:r>
-            <a:r>
-              <a:rPr lang="en-US" dirty="0" smtClean="0"/>
-              <a:t>Algorithms, Put product in S3</a:t>
+              <a:t>: Python Algorithms, Put product in S3</a:t>
             </a:r>
             <a:endParaRPr lang="en-US" dirty="0"/>
           </a:p>

</xml_diff>